<commit_message>
presentatie nog niet helemaal af
</commit_message>
<xml_diff>
--- a/Presentations/Proteasen - week 1.pptx
+++ b/Presentations/Proteasen - week 1.pptx
@@ -10,8 +10,9 @@
     <p:sldId id="263" r:id="rId4"/>
     <p:sldId id="260" r:id="rId5"/>
     <p:sldId id="266" r:id="rId6"/>
-    <p:sldId id="264" r:id="rId7"/>
-    <p:sldId id="265" r:id="rId8"/>
+    <p:sldId id="265" r:id="rId7"/>
+    <p:sldId id="267" r:id="rId8"/>
+    <p:sldId id="268" r:id="rId9"/>
   </p:sldIdLst>
   <p:sldSz cx="12192000" cy="6858000"/>
   <p:notesSz cx="6858000" cy="9144000"/>
@@ -135,7 +136,7 @@
           <p:cNvPr id="2" name="Titel 1">
             <a:extLst>
               <a:ext uri="{FF2B5EF4-FFF2-40B4-BE49-F238E27FC236}">
-                <a16:creationId xmlns:a16="http://schemas.microsoft.com/office/drawing/2014/main" xmlns="" id="{EFD99023-B551-45B8-A12C-2917446E04BE}"/>
+                <a16:creationId xmlns="" xmlns:a16="http://schemas.microsoft.com/office/drawing/2014/main" id="{EFD99023-B551-45B8-A12C-2917446E04BE}"/>
               </a:ext>
             </a:extLst>
           </p:cNvPr>
@@ -172,7 +173,7 @@
           <p:cNvPr id="3" name="Ondertitel 2">
             <a:extLst>
               <a:ext uri="{FF2B5EF4-FFF2-40B4-BE49-F238E27FC236}">
-                <a16:creationId xmlns:a16="http://schemas.microsoft.com/office/drawing/2014/main" xmlns="" id="{2E009DEA-736C-495D-A0BD-D3CB755CD810}"/>
+                <a16:creationId xmlns="" xmlns:a16="http://schemas.microsoft.com/office/drawing/2014/main" id="{2E009DEA-736C-495D-A0BD-D3CB755CD810}"/>
               </a:ext>
             </a:extLst>
           </p:cNvPr>
@@ -242,7 +243,7 @@
           <p:cNvPr id="4" name="Tijdelijke aanduiding voor datum 3">
             <a:extLst>
               <a:ext uri="{FF2B5EF4-FFF2-40B4-BE49-F238E27FC236}">
-                <a16:creationId xmlns:a16="http://schemas.microsoft.com/office/drawing/2014/main" xmlns="" id="{67209F8F-9D5D-4D9E-AC0A-70E79D66B973}"/>
+                <a16:creationId xmlns="" xmlns:a16="http://schemas.microsoft.com/office/drawing/2014/main" id="{67209F8F-9D5D-4D9E-AC0A-70E79D66B973}"/>
               </a:ext>
             </a:extLst>
           </p:cNvPr>
@@ -261,7 +262,7 @@
             <a:fld id="{ADE4902F-FBEA-4B35-9D62-082FA2608761}" type="datetimeFigureOut">
               <a:rPr lang="nl-NL" smtClean="0"/>
               <a:pPr/>
-              <a:t>14-11-2017</a:t>
+              <a:t>4-12-2017</a:t>
             </a:fld>
             <a:endParaRPr lang="nl-NL"/>
           </a:p>
@@ -272,7 +273,7 @@
           <p:cNvPr id="5" name="Tijdelijke aanduiding voor voettekst 4">
             <a:extLst>
               <a:ext uri="{FF2B5EF4-FFF2-40B4-BE49-F238E27FC236}">
-                <a16:creationId xmlns:a16="http://schemas.microsoft.com/office/drawing/2014/main" xmlns="" id="{54E64078-7028-4A61-9D1A-E34F5B16D07A}"/>
+                <a16:creationId xmlns="" xmlns:a16="http://schemas.microsoft.com/office/drawing/2014/main" id="{54E64078-7028-4A61-9D1A-E34F5B16D07A}"/>
               </a:ext>
             </a:extLst>
           </p:cNvPr>
@@ -297,7 +298,7 @@
           <p:cNvPr id="6" name="Tijdelijke aanduiding voor dianummer 5">
             <a:extLst>
               <a:ext uri="{FF2B5EF4-FFF2-40B4-BE49-F238E27FC236}">
-                <a16:creationId xmlns:a16="http://schemas.microsoft.com/office/drawing/2014/main" xmlns="" id="{F94CF3BC-A337-46FC-9ED2-A70F074C57CD}"/>
+                <a16:creationId xmlns="" xmlns:a16="http://schemas.microsoft.com/office/drawing/2014/main" id="{F94CF3BC-A337-46FC-9ED2-A70F074C57CD}"/>
               </a:ext>
             </a:extLst>
           </p:cNvPr>
@@ -316,7 +317,7 @@
             <a:fld id="{1C1C122E-05CA-4289-A26B-D14C5EAD5EFF}" type="slidenum">
               <a:rPr lang="nl-NL" smtClean="0"/>
               <a:pPr/>
-              <a:t>‹#›</a:t>
+              <a:t>‹nr.›</a:t>
             </a:fld>
             <a:endParaRPr lang="nl-NL"/>
           </a:p>
@@ -325,7 +326,7 @@
     </p:spTree>
     <p:extLst>
       <p:ext uri="{BB962C8B-B14F-4D97-AF65-F5344CB8AC3E}">
-        <p14:creationId xmlns:p14="http://schemas.microsoft.com/office/powerpoint/2010/main" val="3805358241"/>
+        <p14:creationId xmlns:p14="http://schemas.microsoft.com/office/powerpoint/2010/main" xmlns="" val="3805358241"/>
       </p:ext>
     </p:extLst>
   </p:cSld>
@@ -357,7 +358,7 @@
           <p:cNvPr id="2" name="Titel 1">
             <a:extLst>
               <a:ext uri="{FF2B5EF4-FFF2-40B4-BE49-F238E27FC236}">
-                <a16:creationId xmlns:a16="http://schemas.microsoft.com/office/drawing/2014/main" xmlns="" id="{A0360AC8-B78F-4264-BCDD-ACDC27E57432}"/>
+                <a16:creationId xmlns="" xmlns:a16="http://schemas.microsoft.com/office/drawing/2014/main" id="{A0360AC8-B78F-4264-BCDD-ACDC27E57432}"/>
               </a:ext>
             </a:extLst>
           </p:cNvPr>
@@ -385,7 +386,7 @@
           <p:cNvPr id="3" name="Tijdelijke aanduiding voor verticale tekst 2">
             <a:extLst>
               <a:ext uri="{FF2B5EF4-FFF2-40B4-BE49-F238E27FC236}">
-                <a16:creationId xmlns:a16="http://schemas.microsoft.com/office/drawing/2014/main" xmlns="" id="{CBC2C12D-CEBD-47C9-B6B8-76D5A5B9B46B}"/>
+                <a16:creationId xmlns="" xmlns:a16="http://schemas.microsoft.com/office/drawing/2014/main" id="{CBC2C12D-CEBD-47C9-B6B8-76D5A5B9B46B}"/>
               </a:ext>
             </a:extLst>
           </p:cNvPr>
@@ -442,7 +443,7 @@
           <p:cNvPr id="4" name="Tijdelijke aanduiding voor datum 3">
             <a:extLst>
               <a:ext uri="{FF2B5EF4-FFF2-40B4-BE49-F238E27FC236}">
-                <a16:creationId xmlns:a16="http://schemas.microsoft.com/office/drawing/2014/main" xmlns="" id="{99C3A252-6B99-4635-BB91-A7D08534575D}"/>
+                <a16:creationId xmlns="" xmlns:a16="http://schemas.microsoft.com/office/drawing/2014/main" id="{99C3A252-6B99-4635-BB91-A7D08534575D}"/>
               </a:ext>
             </a:extLst>
           </p:cNvPr>
@@ -461,7 +462,7 @@
             <a:fld id="{ADE4902F-FBEA-4B35-9D62-082FA2608761}" type="datetimeFigureOut">
               <a:rPr lang="nl-NL" smtClean="0"/>
               <a:pPr/>
-              <a:t>14-11-2017</a:t>
+              <a:t>4-12-2017</a:t>
             </a:fld>
             <a:endParaRPr lang="nl-NL"/>
           </a:p>
@@ -472,7 +473,7 @@
           <p:cNvPr id="5" name="Tijdelijke aanduiding voor voettekst 4">
             <a:extLst>
               <a:ext uri="{FF2B5EF4-FFF2-40B4-BE49-F238E27FC236}">
-                <a16:creationId xmlns:a16="http://schemas.microsoft.com/office/drawing/2014/main" xmlns="" id="{55C44EC4-4316-439A-80F3-5CF8FA8B9E4D}"/>
+                <a16:creationId xmlns="" xmlns:a16="http://schemas.microsoft.com/office/drawing/2014/main" id="{55C44EC4-4316-439A-80F3-5CF8FA8B9E4D}"/>
               </a:ext>
             </a:extLst>
           </p:cNvPr>
@@ -497,7 +498,7 @@
           <p:cNvPr id="6" name="Tijdelijke aanduiding voor dianummer 5">
             <a:extLst>
               <a:ext uri="{FF2B5EF4-FFF2-40B4-BE49-F238E27FC236}">
-                <a16:creationId xmlns:a16="http://schemas.microsoft.com/office/drawing/2014/main" xmlns="" id="{51651B2C-E2E2-469B-9BC0-4F51A8AB8FCF}"/>
+                <a16:creationId xmlns="" xmlns:a16="http://schemas.microsoft.com/office/drawing/2014/main" id="{51651B2C-E2E2-469B-9BC0-4F51A8AB8FCF}"/>
               </a:ext>
             </a:extLst>
           </p:cNvPr>
@@ -516,7 +517,7 @@
             <a:fld id="{1C1C122E-05CA-4289-A26B-D14C5EAD5EFF}" type="slidenum">
               <a:rPr lang="nl-NL" smtClean="0"/>
               <a:pPr/>
-              <a:t>‹#›</a:t>
+              <a:t>‹nr.›</a:t>
             </a:fld>
             <a:endParaRPr lang="nl-NL"/>
           </a:p>
@@ -525,7 +526,7 @@
     </p:spTree>
     <p:extLst>
       <p:ext uri="{BB962C8B-B14F-4D97-AF65-F5344CB8AC3E}">
-        <p14:creationId xmlns:p14="http://schemas.microsoft.com/office/powerpoint/2010/main" val="3203477417"/>
+        <p14:creationId xmlns:p14="http://schemas.microsoft.com/office/powerpoint/2010/main" xmlns="" val="3203477417"/>
       </p:ext>
     </p:extLst>
   </p:cSld>
@@ -557,7 +558,7 @@
           <p:cNvPr id="2" name="Verticale titel 1">
             <a:extLst>
               <a:ext uri="{FF2B5EF4-FFF2-40B4-BE49-F238E27FC236}">
-                <a16:creationId xmlns:a16="http://schemas.microsoft.com/office/drawing/2014/main" xmlns="" id="{A8495113-02DB-4A72-A690-2DCF724F608D}"/>
+                <a16:creationId xmlns="" xmlns:a16="http://schemas.microsoft.com/office/drawing/2014/main" id="{A8495113-02DB-4A72-A690-2DCF724F608D}"/>
               </a:ext>
             </a:extLst>
           </p:cNvPr>
@@ -590,7 +591,7 @@
           <p:cNvPr id="3" name="Tijdelijke aanduiding voor verticale tekst 2">
             <a:extLst>
               <a:ext uri="{FF2B5EF4-FFF2-40B4-BE49-F238E27FC236}">
-                <a16:creationId xmlns:a16="http://schemas.microsoft.com/office/drawing/2014/main" xmlns="" id="{C31B8AC1-42B5-4119-AC97-D81F532327F3}"/>
+                <a16:creationId xmlns="" xmlns:a16="http://schemas.microsoft.com/office/drawing/2014/main" id="{C31B8AC1-42B5-4119-AC97-D81F532327F3}"/>
               </a:ext>
             </a:extLst>
           </p:cNvPr>
@@ -652,7 +653,7 @@
           <p:cNvPr id="4" name="Tijdelijke aanduiding voor datum 3">
             <a:extLst>
               <a:ext uri="{FF2B5EF4-FFF2-40B4-BE49-F238E27FC236}">
-                <a16:creationId xmlns:a16="http://schemas.microsoft.com/office/drawing/2014/main" xmlns="" id="{C56E96B1-1940-4306-AE29-87A98AD3166A}"/>
+                <a16:creationId xmlns="" xmlns:a16="http://schemas.microsoft.com/office/drawing/2014/main" id="{C56E96B1-1940-4306-AE29-87A98AD3166A}"/>
               </a:ext>
             </a:extLst>
           </p:cNvPr>
@@ -671,7 +672,7 @@
             <a:fld id="{ADE4902F-FBEA-4B35-9D62-082FA2608761}" type="datetimeFigureOut">
               <a:rPr lang="nl-NL" smtClean="0"/>
               <a:pPr/>
-              <a:t>14-11-2017</a:t>
+              <a:t>4-12-2017</a:t>
             </a:fld>
             <a:endParaRPr lang="nl-NL"/>
           </a:p>
@@ -682,7 +683,7 @@
           <p:cNvPr id="5" name="Tijdelijke aanduiding voor voettekst 4">
             <a:extLst>
               <a:ext uri="{FF2B5EF4-FFF2-40B4-BE49-F238E27FC236}">
-                <a16:creationId xmlns:a16="http://schemas.microsoft.com/office/drawing/2014/main" xmlns="" id="{A5988C8F-FC0C-4CBE-BA17-CA0DFB99C566}"/>
+                <a16:creationId xmlns="" xmlns:a16="http://schemas.microsoft.com/office/drawing/2014/main" id="{A5988C8F-FC0C-4CBE-BA17-CA0DFB99C566}"/>
               </a:ext>
             </a:extLst>
           </p:cNvPr>
@@ -707,7 +708,7 @@
           <p:cNvPr id="6" name="Tijdelijke aanduiding voor dianummer 5">
             <a:extLst>
               <a:ext uri="{FF2B5EF4-FFF2-40B4-BE49-F238E27FC236}">
-                <a16:creationId xmlns:a16="http://schemas.microsoft.com/office/drawing/2014/main" xmlns="" id="{5965722C-5852-44DE-9F55-897A005A5E6B}"/>
+                <a16:creationId xmlns="" xmlns:a16="http://schemas.microsoft.com/office/drawing/2014/main" id="{5965722C-5852-44DE-9F55-897A005A5E6B}"/>
               </a:ext>
             </a:extLst>
           </p:cNvPr>
@@ -726,7 +727,7 @@
             <a:fld id="{1C1C122E-05CA-4289-A26B-D14C5EAD5EFF}" type="slidenum">
               <a:rPr lang="nl-NL" smtClean="0"/>
               <a:pPr/>
-              <a:t>‹#›</a:t>
+              <a:t>‹nr.›</a:t>
             </a:fld>
             <a:endParaRPr lang="nl-NL"/>
           </a:p>
@@ -735,7 +736,7 @@
     </p:spTree>
     <p:extLst>
       <p:ext uri="{BB962C8B-B14F-4D97-AF65-F5344CB8AC3E}">
-        <p14:creationId xmlns:p14="http://schemas.microsoft.com/office/powerpoint/2010/main" val="1094053022"/>
+        <p14:creationId xmlns:p14="http://schemas.microsoft.com/office/powerpoint/2010/main" xmlns="" val="1094053022"/>
       </p:ext>
     </p:extLst>
   </p:cSld>
@@ -767,7 +768,7 @@
           <p:cNvPr id="2" name="Titel 1">
             <a:extLst>
               <a:ext uri="{FF2B5EF4-FFF2-40B4-BE49-F238E27FC236}">
-                <a16:creationId xmlns:a16="http://schemas.microsoft.com/office/drawing/2014/main" xmlns="" id="{016A3A2C-E9A1-46E3-B56B-6107511A4824}"/>
+                <a16:creationId xmlns="" xmlns:a16="http://schemas.microsoft.com/office/drawing/2014/main" id="{016A3A2C-E9A1-46E3-B56B-6107511A4824}"/>
               </a:ext>
             </a:extLst>
           </p:cNvPr>
@@ -795,7 +796,7 @@
           <p:cNvPr id="3" name="Tijdelijke aanduiding voor inhoud 2">
             <a:extLst>
               <a:ext uri="{FF2B5EF4-FFF2-40B4-BE49-F238E27FC236}">
-                <a16:creationId xmlns:a16="http://schemas.microsoft.com/office/drawing/2014/main" xmlns="" id="{3767E90F-0F89-4A06-B8E9-1CDE6F03C9ED}"/>
+                <a16:creationId xmlns="" xmlns:a16="http://schemas.microsoft.com/office/drawing/2014/main" id="{3767E90F-0F89-4A06-B8E9-1CDE6F03C9ED}"/>
               </a:ext>
             </a:extLst>
           </p:cNvPr>
@@ -852,7 +853,7 @@
           <p:cNvPr id="4" name="Tijdelijke aanduiding voor datum 3">
             <a:extLst>
               <a:ext uri="{FF2B5EF4-FFF2-40B4-BE49-F238E27FC236}">
-                <a16:creationId xmlns:a16="http://schemas.microsoft.com/office/drawing/2014/main" xmlns="" id="{03A33B9D-72AD-41A2-B2D2-DD46DAD7D7DC}"/>
+                <a16:creationId xmlns="" xmlns:a16="http://schemas.microsoft.com/office/drawing/2014/main" id="{03A33B9D-72AD-41A2-B2D2-DD46DAD7D7DC}"/>
               </a:ext>
             </a:extLst>
           </p:cNvPr>
@@ -871,7 +872,7 @@
             <a:fld id="{ADE4902F-FBEA-4B35-9D62-082FA2608761}" type="datetimeFigureOut">
               <a:rPr lang="nl-NL" smtClean="0"/>
               <a:pPr/>
-              <a:t>14-11-2017</a:t>
+              <a:t>4-12-2017</a:t>
             </a:fld>
             <a:endParaRPr lang="nl-NL"/>
           </a:p>
@@ -882,7 +883,7 @@
           <p:cNvPr id="5" name="Tijdelijke aanduiding voor voettekst 4">
             <a:extLst>
               <a:ext uri="{FF2B5EF4-FFF2-40B4-BE49-F238E27FC236}">
-                <a16:creationId xmlns:a16="http://schemas.microsoft.com/office/drawing/2014/main" xmlns="" id="{B66C81FA-DFF3-464A-B628-347A5430C915}"/>
+                <a16:creationId xmlns="" xmlns:a16="http://schemas.microsoft.com/office/drawing/2014/main" id="{B66C81FA-DFF3-464A-B628-347A5430C915}"/>
               </a:ext>
             </a:extLst>
           </p:cNvPr>
@@ -907,7 +908,7 @@
           <p:cNvPr id="6" name="Tijdelijke aanduiding voor dianummer 5">
             <a:extLst>
               <a:ext uri="{FF2B5EF4-FFF2-40B4-BE49-F238E27FC236}">
-                <a16:creationId xmlns:a16="http://schemas.microsoft.com/office/drawing/2014/main" xmlns="" id="{CCA4C3AF-1A2F-4B35-ADA6-C3C3322C3EFE}"/>
+                <a16:creationId xmlns="" xmlns:a16="http://schemas.microsoft.com/office/drawing/2014/main" id="{CCA4C3AF-1A2F-4B35-ADA6-C3C3322C3EFE}"/>
               </a:ext>
             </a:extLst>
           </p:cNvPr>
@@ -926,7 +927,7 @@
             <a:fld id="{1C1C122E-05CA-4289-A26B-D14C5EAD5EFF}" type="slidenum">
               <a:rPr lang="nl-NL" smtClean="0"/>
               <a:pPr/>
-              <a:t>‹#›</a:t>
+              <a:t>‹nr.›</a:t>
             </a:fld>
             <a:endParaRPr lang="nl-NL"/>
           </a:p>
@@ -935,7 +936,7 @@
     </p:spTree>
     <p:extLst>
       <p:ext uri="{BB962C8B-B14F-4D97-AF65-F5344CB8AC3E}">
-        <p14:creationId xmlns:p14="http://schemas.microsoft.com/office/powerpoint/2010/main" val="1515944853"/>
+        <p14:creationId xmlns:p14="http://schemas.microsoft.com/office/powerpoint/2010/main" xmlns="" val="1515944853"/>
       </p:ext>
     </p:extLst>
   </p:cSld>
@@ -967,7 +968,7 @@
           <p:cNvPr id="2" name="Titel 1">
             <a:extLst>
               <a:ext uri="{FF2B5EF4-FFF2-40B4-BE49-F238E27FC236}">
-                <a16:creationId xmlns:a16="http://schemas.microsoft.com/office/drawing/2014/main" xmlns="" id="{07CEC788-F9AF-4924-B3FC-70812FE0AB92}"/>
+                <a16:creationId xmlns="" xmlns:a16="http://schemas.microsoft.com/office/drawing/2014/main" id="{07CEC788-F9AF-4924-B3FC-70812FE0AB92}"/>
               </a:ext>
             </a:extLst>
           </p:cNvPr>
@@ -1004,7 +1005,7 @@
           <p:cNvPr id="3" name="Tijdelijke aanduiding voor tekst 2">
             <a:extLst>
               <a:ext uri="{FF2B5EF4-FFF2-40B4-BE49-F238E27FC236}">
-                <a16:creationId xmlns:a16="http://schemas.microsoft.com/office/drawing/2014/main" xmlns="" id="{259BBFA2-C0C3-4F5C-8BAF-0B57144C20E3}"/>
+                <a16:creationId xmlns="" xmlns:a16="http://schemas.microsoft.com/office/drawing/2014/main" id="{259BBFA2-C0C3-4F5C-8BAF-0B57144C20E3}"/>
               </a:ext>
             </a:extLst>
           </p:cNvPr>
@@ -1129,7 +1130,7 @@
           <p:cNvPr id="4" name="Tijdelijke aanduiding voor datum 3">
             <a:extLst>
               <a:ext uri="{FF2B5EF4-FFF2-40B4-BE49-F238E27FC236}">
-                <a16:creationId xmlns:a16="http://schemas.microsoft.com/office/drawing/2014/main" xmlns="" id="{8631F680-A0FA-4DD5-978B-B3C3DC404E65}"/>
+                <a16:creationId xmlns="" xmlns:a16="http://schemas.microsoft.com/office/drawing/2014/main" id="{8631F680-A0FA-4DD5-978B-B3C3DC404E65}"/>
               </a:ext>
             </a:extLst>
           </p:cNvPr>
@@ -1148,7 +1149,7 @@
             <a:fld id="{ADE4902F-FBEA-4B35-9D62-082FA2608761}" type="datetimeFigureOut">
               <a:rPr lang="nl-NL" smtClean="0"/>
               <a:pPr/>
-              <a:t>14-11-2017</a:t>
+              <a:t>4-12-2017</a:t>
             </a:fld>
             <a:endParaRPr lang="nl-NL"/>
           </a:p>
@@ -1159,7 +1160,7 @@
           <p:cNvPr id="5" name="Tijdelijke aanduiding voor voettekst 4">
             <a:extLst>
               <a:ext uri="{FF2B5EF4-FFF2-40B4-BE49-F238E27FC236}">
-                <a16:creationId xmlns:a16="http://schemas.microsoft.com/office/drawing/2014/main" xmlns="" id="{7F1F8561-6E64-42ED-8CB5-A7BBAFAFCF46}"/>
+                <a16:creationId xmlns="" xmlns:a16="http://schemas.microsoft.com/office/drawing/2014/main" id="{7F1F8561-6E64-42ED-8CB5-A7BBAFAFCF46}"/>
               </a:ext>
             </a:extLst>
           </p:cNvPr>
@@ -1184,7 +1185,7 @@
           <p:cNvPr id="6" name="Tijdelijke aanduiding voor dianummer 5">
             <a:extLst>
               <a:ext uri="{FF2B5EF4-FFF2-40B4-BE49-F238E27FC236}">
-                <a16:creationId xmlns:a16="http://schemas.microsoft.com/office/drawing/2014/main" xmlns="" id="{BE90B6D3-0E9B-4F75-9578-944B4C631782}"/>
+                <a16:creationId xmlns="" xmlns:a16="http://schemas.microsoft.com/office/drawing/2014/main" id="{BE90B6D3-0E9B-4F75-9578-944B4C631782}"/>
               </a:ext>
             </a:extLst>
           </p:cNvPr>
@@ -1203,7 +1204,7 @@
             <a:fld id="{1C1C122E-05CA-4289-A26B-D14C5EAD5EFF}" type="slidenum">
               <a:rPr lang="nl-NL" smtClean="0"/>
               <a:pPr/>
-              <a:t>‹#›</a:t>
+              <a:t>‹nr.›</a:t>
             </a:fld>
             <a:endParaRPr lang="nl-NL"/>
           </a:p>
@@ -1212,7 +1213,7 @@
     </p:spTree>
     <p:extLst>
       <p:ext uri="{BB962C8B-B14F-4D97-AF65-F5344CB8AC3E}">
-        <p14:creationId xmlns:p14="http://schemas.microsoft.com/office/powerpoint/2010/main" val="858119523"/>
+        <p14:creationId xmlns:p14="http://schemas.microsoft.com/office/powerpoint/2010/main" xmlns="" val="858119523"/>
       </p:ext>
     </p:extLst>
   </p:cSld>
@@ -1244,7 +1245,7 @@
           <p:cNvPr id="2" name="Titel 1">
             <a:extLst>
               <a:ext uri="{FF2B5EF4-FFF2-40B4-BE49-F238E27FC236}">
-                <a16:creationId xmlns:a16="http://schemas.microsoft.com/office/drawing/2014/main" xmlns="" id="{77E2AA73-853E-40A1-9A01-2322859C1E57}"/>
+                <a16:creationId xmlns="" xmlns:a16="http://schemas.microsoft.com/office/drawing/2014/main" id="{77E2AA73-853E-40A1-9A01-2322859C1E57}"/>
               </a:ext>
             </a:extLst>
           </p:cNvPr>
@@ -1272,7 +1273,7 @@
           <p:cNvPr id="3" name="Tijdelijke aanduiding voor inhoud 2">
             <a:extLst>
               <a:ext uri="{FF2B5EF4-FFF2-40B4-BE49-F238E27FC236}">
-                <a16:creationId xmlns:a16="http://schemas.microsoft.com/office/drawing/2014/main" xmlns="" id="{D3A30AEC-A453-4488-9ED3-1DB9B54B5E44}"/>
+                <a16:creationId xmlns="" xmlns:a16="http://schemas.microsoft.com/office/drawing/2014/main" id="{D3A30AEC-A453-4488-9ED3-1DB9B54B5E44}"/>
               </a:ext>
             </a:extLst>
           </p:cNvPr>
@@ -1334,7 +1335,7 @@
           <p:cNvPr id="4" name="Tijdelijke aanduiding voor inhoud 3">
             <a:extLst>
               <a:ext uri="{FF2B5EF4-FFF2-40B4-BE49-F238E27FC236}">
-                <a16:creationId xmlns:a16="http://schemas.microsoft.com/office/drawing/2014/main" xmlns="" id="{91D637F4-ACDA-4978-9A41-A140CB08D61A}"/>
+                <a16:creationId xmlns="" xmlns:a16="http://schemas.microsoft.com/office/drawing/2014/main" id="{91D637F4-ACDA-4978-9A41-A140CB08D61A}"/>
               </a:ext>
             </a:extLst>
           </p:cNvPr>
@@ -1396,7 +1397,7 @@
           <p:cNvPr id="5" name="Tijdelijke aanduiding voor datum 4">
             <a:extLst>
               <a:ext uri="{FF2B5EF4-FFF2-40B4-BE49-F238E27FC236}">
-                <a16:creationId xmlns:a16="http://schemas.microsoft.com/office/drawing/2014/main" xmlns="" id="{837E7DD3-15C8-411D-B870-A08B6F78EE10}"/>
+                <a16:creationId xmlns="" xmlns:a16="http://schemas.microsoft.com/office/drawing/2014/main" id="{837E7DD3-15C8-411D-B870-A08B6F78EE10}"/>
               </a:ext>
             </a:extLst>
           </p:cNvPr>
@@ -1415,7 +1416,7 @@
             <a:fld id="{ADE4902F-FBEA-4B35-9D62-082FA2608761}" type="datetimeFigureOut">
               <a:rPr lang="nl-NL" smtClean="0"/>
               <a:pPr/>
-              <a:t>14-11-2017</a:t>
+              <a:t>4-12-2017</a:t>
             </a:fld>
             <a:endParaRPr lang="nl-NL"/>
           </a:p>
@@ -1426,7 +1427,7 @@
           <p:cNvPr id="6" name="Tijdelijke aanduiding voor voettekst 5">
             <a:extLst>
               <a:ext uri="{FF2B5EF4-FFF2-40B4-BE49-F238E27FC236}">
-                <a16:creationId xmlns:a16="http://schemas.microsoft.com/office/drawing/2014/main" xmlns="" id="{D36B0671-9A72-41D6-8923-9F431EE758F9}"/>
+                <a16:creationId xmlns="" xmlns:a16="http://schemas.microsoft.com/office/drawing/2014/main" id="{D36B0671-9A72-41D6-8923-9F431EE758F9}"/>
               </a:ext>
             </a:extLst>
           </p:cNvPr>
@@ -1451,7 +1452,7 @@
           <p:cNvPr id="7" name="Tijdelijke aanduiding voor dianummer 6">
             <a:extLst>
               <a:ext uri="{FF2B5EF4-FFF2-40B4-BE49-F238E27FC236}">
-                <a16:creationId xmlns:a16="http://schemas.microsoft.com/office/drawing/2014/main" xmlns="" id="{6E5DC6FE-5C44-4203-861C-9534D89659E0}"/>
+                <a16:creationId xmlns="" xmlns:a16="http://schemas.microsoft.com/office/drawing/2014/main" id="{6E5DC6FE-5C44-4203-861C-9534D89659E0}"/>
               </a:ext>
             </a:extLst>
           </p:cNvPr>
@@ -1470,7 +1471,7 @@
             <a:fld id="{1C1C122E-05CA-4289-A26B-D14C5EAD5EFF}" type="slidenum">
               <a:rPr lang="nl-NL" smtClean="0"/>
               <a:pPr/>
-              <a:t>‹#›</a:t>
+              <a:t>‹nr.›</a:t>
             </a:fld>
             <a:endParaRPr lang="nl-NL"/>
           </a:p>
@@ -1479,7 +1480,7 @@
     </p:spTree>
     <p:extLst>
       <p:ext uri="{BB962C8B-B14F-4D97-AF65-F5344CB8AC3E}">
-        <p14:creationId xmlns:p14="http://schemas.microsoft.com/office/powerpoint/2010/main" val="816816862"/>
+        <p14:creationId xmlns:p14="http://schemas.microsoft.com/office/powerpoint/2010/main" xmlns="" val="816816862"/>
       </p:ext>
     </p:extLst>
   </p:cSld>
@@ -1511,7 +1512,7 @@
           <p:cNvPr id="2" name="Titel 1">
             <a:extLst>
               <a:ext uri="{FF2B5EF4-FFF2-40B4-BE49-F238E27FC236}">
-                <a16:creationId xmlns:a16="http://schemas.microsoft.com/office/drawing/2014/main" xmlns="" id="{D297AAFE-77DE-432B-BAB4-CD6F190E343C}"/>
+                <a16:creationId xmlns="" xmlns:a16="http://schemas.microsoft.com/office/drawing/2014/main" id="{D297AAFE-77DE-432B-BAB4-CD6F190E343C}"/>
               </a:ext>
             </a:extLst>
           </p:cNvPr>
@@ -1544,7 +1545,7 @@
           <p:cNvPr id="3" name="Tijdelijke aanduiding voor tekst 2">
             <a:extLst>
               <a:ext uri="{FF2B5EF4-FFF2-40B4-BE49-F238E27FC236}">
-                <a16:creationId xmlns:a16="http://schemas.microsoft.com/office/drawing/2014/main" xmlns="" id="{FFEE2ED6-653E-4421-8218-E2C38C76B28B}"/>
+                <a16:creationId xmlns="" xmlns:a16="http://schemas.microsoft.com/office/drawing/2014/main" id="{FFEE2ED6-653E-4421-8218-E2C38C76B28B}"/>
               </a:ext>
             </a:extLst>
           </p:cNvPr>
@@ -1615,7 +1616,7 @@
           <p:cNvPr id="4" name="Tijdelijke aanduiding voor inhoud 3">
             <a:extLst>
               <a:ext uri="{FF2B5EF4-FFF2-40B4-BE49-F238E27FC236}">
-                <a16:creationId xmlns:a16="http://schemas.microsoft.com/office/drawing/2014/main" xmlns="" id="{DC218CE1-911A-4429-A641-56511F94AE34}"/>
+                <a16:creationId xmlns="" xmlns:a16="http://schemas.microsoft.com/office/drawing/2014/main" id="{DC218CE1-911A-4429-A641-56511F94AE34}"/>
               </a:ext>
             </a:extLst>
           </p:cNvPr>
@@ -1677,7 +1678,7 @@
           <p:cNvPr id="5" name="Tijdelijke aanduiding voor tekst 4">
             <a:extLst>
               <a:ext uri="{FF2B5EF4-FFF2-40B4-BE49-F238E27FC236}">
-                <a16:creationId xmlns:a16="http://schemas.microsoft.com/office/drawing/2014/main" xmlns="" id="{719A6713-F0E0-40AB-A59E-49F09878FEB6}"/>
+                <a16:creationId xmlns="" xmlns:a16="http://schemas.microsoft.com/office/drawing/2014/main" id="{719A6713-F0E0-40AB-A59E-49F09878FEB6}"/>
               </a:ext>
             </a:extLst>
           </p:cNvPr>
@@ -1748,7 +1749,7 @@
           <p:cNvPr id="6" name="Tijdelijke aanduiding voor inhoud 5">
             <a:extLst>
               <a:ext uri="{FF2B5EF4-FFF2-40B4-BE49-F238E27FC236}">
-                <a16:creationId xmlns:a16="http://schemas.microsoft.com/office/drawing/2014/main" xmlns="" id="{C920DA29-52C0-41C1-B347-90F2C9400F3E}"/>
+                <a16:creationId xmlns="" xmlns:a16="http://schemas.microsoft.com/office/drawing/2014/main" id="{C920DA29-52C0-41C1-B347-90F2C9400F3E}"/>
               </a:ext>
             </a:extLst>
           </p:cNvPr>
@@ -1810,7 +1811,7 @@
           <p:cNvPr id="7" name="Tijdelijke aanduiding voor datum 6">
             <a:extLst>
               <a:ext uri="{FF2B5EF4-FFF2-40B4-BE49-F238E27FC236}">
-                <a16:creationId xmlns:a16="http://schemas.microsoft.com/office/drawing/2014/main" xmlns="" id="{8C0EFFE8-712A-45F8-8E44-FFE8CF661B83}"/>
+                <a16:creationId xmlns="" xmlns:a16="http://schemas.microsoft.com/office/drawing/2014/main" id="{8C0EFFE8-712A-45F8-8E44-FFE8CF661B83}"/>
               </a:ext>
             </a:extLst>
           </p:cNvPr>
@@ -1829,7 +1830,7 @@
             <a:fld id="{ADE4902F-FBEA-4B35-9D62-082FA2608761}" type="datetimeFigureOut">
               <a:rPr lang="nl-NL" smtClean="0"/>
               <a:pPr/>
-              <a:t>14-11-2017</a:t>
+              <a:t>4-12-2017</a:t>
             </a:fld>
             <a:endParaRPr lang="nl-NL"/>
           </a:p>
@@ -1840,7 +1841,7 @@
           <p:cNvPr id="8" name="Tijdelijke aanduiding voor voettekst 7">
             <a:extLst>
               <a:ext uri="{FF2B5EF4-FFF2-40B4-BE49-F238E27FC236}">
-                <a16:creationId xmlns:a16="http://schemas.microsoft.com/office/drawing/2014/main" xmlns="" id="{707393AF-B4A9-4351-A40F-50118C94FFB4}"/>
+                <a16:creationId xmlns="" xmlns:a16="http://schemas.microsoft.com/office/drawing/2014/main" id="{707393AF-B4A9-4351-A40F-50118C94FFB4}"/>
               </a:ext>
             </a:extLst>
           </p:cNvPr>
@@ -1865,7 +1866,7 @@
           <p:cNvPr id="9" name="Tijdelijke aanduiding voor dianummer 8">
             <a:extLst>
               <a:ext uri="{FF2B5EF4-FFF2-40B4-BE49-F238E27FC236}">
-                <a16:creationId xmlns:a16="http://schemas.microsoft.com/office/drawing/2014/main" xmlns="" id="{AD5B9F79-2771-46B0-A531-43CC4F757865}"/>
+                <a16:creationId xmlns="" xmlns:a16="http://schemas.microsoft.com/office/drawing/2014/main" id="{AD5B9F79-2771-46B0-A531-43CC4F757865}"/>
               </a:ext>
             </a:extLst>
           </p:cNvPr>
@@ -1884,7 +1885,7 @@
             <a:fld id="{1C1C122E-05CA-4289-A26B-D14C5EAD5EFF}" type="slidenum">
               <a:rPr lang="nl-NL" smtClean="0"/>
               <a:pPr/>
-              <a:t>‹#›</a:t>
+              <a:t>‹nr.›</a:t>
             </a:fld>
             <a:endParaRPr lang="nl-NL"/>
           </a:p>
@@ -1893,7 +1894,7 @@
     </p:spTree>
     <p:extLst>
       <p:ext uri="{BB962C8B-B14F-4D97-AF65-F5344CB8AC3E}">
-        <p14:creationId xmlns:p14="http://schemas.microsoft.com/office/powerpoint/2010/main" val="1099906094"/>
+        <p14:creationId xmlns:p14="http://schemas.microsoft.com/office/powerpoint/2010/main" xmlns="" val="1099906094"/>
       </p:ext>
     </p:extLst>
   </p:cSld>
@@ -1925,7 +1926,7 @@
           <p:cNvPr id="2" name="Titel 1">
             <a:extLst>
               <a:ext uri="{FF2B5EF4-FFF2-40B4-BE49-F238E27FC236}">
-                <a16:creationId xmlns:a16="http://schemas.microsoft.com/office/drawing/2014/main" xmlns="" id="{4E7337EC-1907-4F37-99F3-901F3BE41D1F}"/>
+                <a16:creationId xmlns="" xmlns:a16="http://schemas.microsoft.com/office/drawing/2014/main" id="{4E7337EC-1907-4F37-99F3-901F3BE41D1F}"/>
               </a:ext>
             </a:extLst>
           </p:cNvPr>
@@ -1953,7 +1954,7 @@
           <p:cNvPr id="3" name="Tijdelijke aanduiding voor datum 2">
             <a:extLst>
               <a:ext uri="{FF2B5EF4-FFF2-40B4-BE49-F238E27FC236}">
-                <a16:creationId xmlns:a16="http://schemas.microsoft.com/office/drawing/2014/main" xmlns="" id="{0D2E5F80-FF84-4F1C-92AC-EB22C4EFDEB3}"/>
+                <a16:creationId xmlns="" xmlns:a16="http://schemas.microsoft.com/office/drawing/2014/main" id="{0D2E5F80-FF84-4F1C-92AC-EB22C4EFDEB3}"/>
               </a:ext>
             </a:extLst>
           </p:cNvPr>
@@ -1972,7 +1973,7 @@
             <a:fld id="{ADE4902F-FBEA-4B35-9D62-082FA2608761}" type="datetimeFigureOut">
               <a:rPr lang="nl-NL" smtClean="0"/>
               <a:pPr/>
-              <a:t>14-11-2017</a:t>
+              <a:t>4-12-2017</a:t>
             </a:fld>
             <a:endParaRPr lang="nl-NL"/>
           </a:p>
@@ -1983,7 +1984,7 @@
           <p:cNvPr id="4" name="Tijdelijke aanduiding voor voettekst 3">
             <a:extLst>
               <a:ext uri="{FF2B5EF4-FFF2-40B4-BE49-F238E27FC236}">
-                <a16:creationId xmlns:a16="http://schemas.microsoft.com/office/drawing/2014/main" xmlns="" id="{2D45D3C0-7BB6-4031-A805-56B2513F42F3}"/>
+                <a16:creationId xmlns="" xmlns:a16="http://schemas.microsoft.com/office/drawing/2014/main" id="{2D45D3C0-7BB6-4031-A805-56B2513F42F3}"/>
               </a:ext>
             </a:extLst>
           </p:cNvPr>
@@ -2008,7 +2009,7 @@
           <p:cNvPr id="5" name="Tijdelijke aanduiding voor dianummer 4">
             <a:extLst>
               <a:ext uri="{FF2B5EF4-FFF2-40B4-BE49-F238E27FC236}">
-                <a16:creationId xmlns:a16="http://schemas.microsoft.com/office/drawing/2014/main" xmlns="" id="{DA2BE903-22BF-4CEF-88FD-933D2CAFCA57}"/>
+                <a16:creationId xmlns="" xmlns:a16="http://schemas.microsoft.com/office/drawing/2014/main" id="{DA2BE903-22BF-4CEF-88FD-933D2CAFCA57}"/>
               </a:ext>
             </a:extLst>
           </p:cNvPr>
@@ -2027,7 +2028,7 @@
             <a:fld id="{1C1C122E-05CA-4289-A26B-D14C5EAD5EFF}" type="slidenum">
               <a:rPr lang="nl-NL" smtClean="0"/>
               <a:pPr/>
-              <a:t>‹#›</a:t>
+              <a:t>‹nr.›</a:t>
             </a:fld>
             <a:endParaRPr lang="nl-NL"/>
           </a:p>
@@ -2036,7 +2037,7 @@
     </p:spTree>
     <p:extLst>
       <p:ext uri="{BB962C8B-B14F-4D97-AF65-F5344CB8AC3E}">
-        <p14:creationId xmlns:p14="http://schemas.microsoft.com/office/powerpoint/2010/main" val="1053118753"/>
+        <p14:creationId xmlns:p14="http://schemas.microsoft.com/office/powerpoint/2010/main" xmlns="" val="1053118753"/>
       </p:ext>
     </p:extLst>
   </p:cSld>
@@ -2068,7 +2069,7 @@
           <p:cNvPr id="2" name="Tijdelijke aanduiding voor datum 1">
             <a:extLst>
               <a:ext uri="{FF2B5EF4-FFF2-40B4-BE49-F238E27FC236}">
-                <a16:creationId xmlns:a16="http://schemas.microsoft.com/office/drawing/2014/main" xmlns="" id="{6FCDA235-3242-403B-A485-36B7AD8E1C39}"/>
+                <a16:creationId xmlns="" xmlns:a16="http://schemas.microsoft.com/office/drawing/2014/main" id="{6FCDA235-3242-403B-A485-36B7AD8E1C39}"/>
               </a:ext>
             </a:extLst>
           </p:cNvPr>
@@ -2087,7 +2088,7 @@
             <a:fld id="{ADE4902F-FBEA-4B35-9D62-082FA2608761}" type="datetimeFigureOut">
               <a:rPr lang="nl-NL" smtClean="0"/>
               <a:pPr/>
-              <a:t>14-11-2017</a:t>
+              <a:t>4-12-2017</a:t>
             </a:fld>
             <a:endParaRPr lang="nl-NL"/>
           </a:p>
@@ -2098,7 +2099,7 @@
           <p:cNvPr id="3" name="Tijdelijke aanduiding voor voettekst 2">
             <a:extLst>
               <a:ext uri="{FF2B5EF4-FFF2-40B4-BE49-F238E27FC236}">
-                <a16:creationId xmlns:a16="http://schemas.microsoft.com/office/drawing/2014/main" xmlns="" id="{A75D1976-1CB9-48E7-9C11-87960D6E632C}"/>
+                <a16:creationId xmlns="" xmlns:a16="http://schemas.microsoft.com/office/drawing/2014/main" id="{A75D1976-1CB9-48E7-9C11-87960D6E632C}"/>
               </a:ext>
             </a:extLst>
           </p:cNvPr>
@@ -2123,7 +2124,7 @@
           <p:cNvPr id="4" name="Tijdelijke aanduiding voor dianummer 3">
             <a:extLst>
               <a:ext uri="{FF2B5EF4-FFF2-40B4-BE49-F238E27FC236}">
-                <a16:creationId xmlns:a16="http://schemas.microsoft.com/office/drawing/2014/main" xmlns="" id="{134A5D73-9591-4C49-92DA-172564BBF62F}"/>
+                <a16:creationId xmlns="" xmlns:a16="http://schemas.microsoft.com/office/drawing/2014/main" id="{134A5D73-9591-4C49-92DA-172564BBF62F}"/>
               </a:ext>
             </a:extLst>
           </p:cNvPr>
@@ -2142,7 +2143,7 @@
             <a:fld id="{1C1C122E-05CA-4289-A26B-D14C5EAD5EFF}" type="slidenum">
               <a:rPr lang="nl-NL" smtClean="0"/>
               <a:pPr/>
-              <a:t>‹#›</a:t>
+              <a:t>‹nr.›</a:t>
             </a:fld>
             <a:endParaRPr lang="nl-NL"/>
           </a:p>
@@ -2151,7 +2152,7 @@
     </p:spTree>
     <p:extLst>
       <p:ext uri="{BB962C8B-B14F-4D97-AF65-F5344CB8AC3E}">
-        <p14:creationId xmlns:p14="http://schemas.microsoft.com/office/powerpoint/2010/main" val="593443286"/>
+        <p14:creationId xmlns:p14="http://schemas.microsoft.com/office/powerpoint/2010/main" xmlns="" val="593443286"/>
       </p:ext>
     </p:extLst>
   </p:cSld>
@@ -2183,7 +2184,7 @@
           <p:cNvPr id="2" name="Titel 1">
             <a:extLst>
               <a:ext uri="{FF2B5EF4-FFF2-40B4-BE49-F238E27FC236}">
-                <a16:creationId xmlns:a16="http://schemas.microsoft.com/office/drawing/2014/main" xmlns="" id="{7CF9EBF2-9E8A-476C-BC8A-02CD44989AD9}"/>
+                <a16:creationId xmlns="" xmlns:a16="http://schemas.microsoft.com/office/drawing/2014/main" id="{7CF9EBF2-9E8A-476C-BC8A-02CD44989AD9}"/>
               </a:ext>
             </a:extLst>
           </p:cNvPr>
@@ -2220,7 +2221,7 @@
           <p:cNvPr id="3" name="Tijdelijke aanduiding voor inhoud 2">
             <a:extLst>
               <a:ext uri="{FF2B5EF4-FFF2-40B4-BE49-F238E27FC236}">
-                <a16:creationId xmlns:a16="http://schemas.microsoft.com/office/drawing/2014/main" xmlns="" id="{081F15E5-A94C-4A05-918B-AC99C8EA0CB7}"/>
+                <a16:creationId xmlns="" xmlns:a16="http://schemas.microsoft.com/office/drawing/2014/main" id="{081F15E5-A94C-4A05-918B-AC99C8EA0CB7}"/>
               </a:ext>
             </a:extLst>
           </p:cNvPr>
@@ -2310,7 +2311,7 @@
           <p:cNvPr id="4" name="Tijdelijke aanduiding voor tekst 3">
             <a:extLst>
               <a:ext uri="{FF2B5EF4-FFF2-40B4-BE49-F238E27FC236}">
-                <a16:creationId xmlns:a16="http://schemas.microsoft.com/office/drawing/2014/main" xmlns="" id="{91275F6F-5CE8-40A9-902C-2803463710F2}"/>
+                <a16:creationId xmlns="" xmlns:a16="http://schemas.microsoft.com/office/drawing/2014/main" id="{91275F6F-5CE8-40A9-902C-2803463710F2}"/>
               </a:ext>
             </a:extLst>
           </p:cNvPr>
@@ -2381,7 +2382,7 @@
           <p:cNvPr id="5" name="Tijdelijke aanduiding voor datum 4">
             <a:extLst>
               <a:ext uri="{FF2B5EF4-FFF2-40B4-BE49-F238E27FC236}">
-                <a16:creationId xmlns:a16="http://schemas.microsoft.com/office/drawing/2014/main" xmlns="" id="{68FB0FC5-537D-441B-B077-1EB601C777AE}"/>
+                <a16:creationId xmlns="" xmlns:a16="http://schemas.microsoft.com/office/drawing/2014/main" id="{68FB0FC5-537D-441B-B077-1EB601C777AE}"/>
               </a:ext>
             </a:extLst>
           </p:cNvPr>
@@ -2400,7 +2401,7 @@
             <a:fld id="{ADE4902F-FBEA-4B35-9D62-082FA2608761}" type="datetimeFigureOut">
               <a:rPr lang="nl-NL" smtClean="0"/>
               <a:pPr/>
-              <a:t>14-11-2017</a:t>
+              <a:t>4-12-2017</a:t>
             </a:fld>
             <a:endParaRPr lang="nl-NL"/>
           </a:p>
@@ -2411,7 +2412,7 @@
           <p:cNvPr id="6" name="Tijdelijke aanduiding voor voettekst 5">
             <a:extLst>
               <a:ext uri="{FF2B5EF4-FFF2-40B4-BE49-F238E27FC236}">
-                <a16:creationId xmlns:a16="http://schemas.microsoft.com/office/drawing/2014/main" xmlns="" id="{55AC121A-0493-418F-8DD7-2DA1EEB74DFF}"/>
+                <a16:creationId xmlns="" xmlns:a16="http://schemas.microsoft.com/office/drawing/2014/main" id="{55AC121A-0493-418F-8DD7-2DA1EEB74DFF}"/>
               </a:ext>
             </a:extLst>
           </p:cNvPr>
@@ -2436,7 +2437,7 @@
           <p:cNvPr id="7" name="Tijdelijke aanduiding voor dianummer 6">
             <a:extLst>
               <a:ext uri="{FF2B5EF4-FFF2-40B4-BE49-F238E27FC236}">
-                <a16:creationId xmlns:a16="http://schemas.microsoft.com/office/drawing/2014/main" xmlns="" id="{9E5BD7A4-C96F-485C-A127-6C55CD09868E}"/>
+                <a16:creationId xmlns="" xmlns:a16="http://schemas.microsoft.com/office/drawing/2014/main" id="{9E5BD7A4-C96F-485C-A127-6C55CD09868E}"/>
               </a:ext>
             </a:extLst>
           </p:cNvPr>
@@ -2455,7 +2456,7 @@
             <a:fld id="{1C1C122E-05CA-4289-A26B-D14C5EAD5EFF}" type="slidenum">
               <a:rPr lang="nl-NL" smtClean="0"/>
               <a:pPr/>
-              <a:t>‹#›</a:t>
+              <a:t>‹nr.›</a:t>
             </a:fld>
             <a:endParaRPr lang="nl-NL"/>
           </a:p>
@@ -2464,7 +2465,7 @@
     </p:spTree>
     <p:extLst>
       <p:ext uri="{BB962C8B-B14F-4D97-AF65-F5344CB8AC3E}">
-        <p14:creationId xmlns:p14="http://schemas.microsoft.com/office/powerpoint/2010/main" val="2276997594"/>
+        <p14:creationId xmlns:p14="http://schemas.microsoft.com/office/powerpoint/2010/main" xmlns="" val="2276997594"/>
       </p:ext>
     </p:extLst>
   </p:cSld>
@@ -2496,7 +2497,7 @@
           <p:cNvPr id="2" name="Titel 1">
             <a:extLst>
               <a:ext uri="{FF2B5EF4-FFF2-40B4-BE49-F238E27FC236}">
-                <a16:creationId xmlns:a16="http://schemas.microsoft.com/office/drawing/2014/main" xmlns="" id="{391195BB-EA6C-4F56-A18C-2951B239D827}"/>
+                <a16:creationId xmlns="" xmlns:a16="http://schemas.microsoft.com/office/drawing/2014/main" id="{391195BB-EA6C-4F56-A18C-2951B239D827}"/>
               </a:ext>
             </a:extLst>
           </p:cNvPr>
@@ -2533,7 +2534,7 @@
           <p:cNvPr id="3" name="Tijdelijke aanduiding voor afbeelding 2">
             <a:extLst>
               <a:ext uri="{FF2B5EF4-FFF2-40B4-BE49-F238E27FC236}">
-                <a16:creationId xmlns:a16="http://schemas.microsoft.com/office/drawing/2014/main" xmlns="" id="{1EE97C47-A53A-4152-848A-0419C12AE634}"/>
+                <a16:creationId xmlns="" xmlns:a16="http://schemas.microsoft.com/office/drawing/2014/main" id="{1EE97C47-A53A-4152-848A-0419C12AE634}"/>
               </a:ext>
             </a:extLst>
           </p:cNvPr>
@@ -2600,7 +2601,7 @@
           <p:cNvPr id="4" name="Tijdelijke aanduiding voor tekst 3">
             <a:extLst>
               <a:ext uri="{FF2B5EF4-FFF2-40B4-BE49-F238E27FC236}">
-                <a16:creationId xmlns:a16="http://schemas.microsoft.com/office/drawing/2014/main" xmlns="" id="{4C380A8A-FCC0-4B2B-BCED-CC719F66356B}"/>
+                <a16:creationId xmlns="" xmlns:a16="http://schemas.microsoft.com/office/drawing/2014/main" id="{4C380A8A-FCC0-4B2B-BCED-CC719F66356B}"/>
               </a:ext>
             </a:extLst>
           </p:cNvPr>
@@ -2671,7 +2672,7 @@
           <p:cNvPr id="5" name="Tijdelijke aanduiding voor datum 4">
             <a:extLst>
               <a:ext uri="{FF2B5EF4-FFF2-40B4-BE49-F238E27FC236}">
-                <a16:creationId xmlns:a16="http://schemas.microsoft.com/office/drawing/2014/main" xmlns="" id="{EAA93FF3-9B86-461A-94CF-C0A759B7033D}"/>
+                <a16:creationId xmlns="" xmlns:a16="http://schemas.microsoft.com/office/drawing/2014/main" id="{EAA93FF3-9B86-461A-94CF-C0A759B7033D}"/>
               </a:ext>
             </a:extLst>
           </p:cNvPr>
@@ -2690,7 +2691,7 @@
             <a:fld id="{ADE4902F-FBEA-4B35-9D62-082FA2608761}" type="datetimeFigureOut">
               <a:rPr lang="nl-NL" smtClean="0"/>
               <a:pPr/>
-              <a:t>14-11-2017</a:t>
+              <a:t>4-12-2017</a:t>
             </a:fld>
             <a:endParaRPr lang="nl-NL"/>
           </a:p>
@@ -2701,7 +2702,7 @@
           <p:cNvPr id="6" name="Tijdelijke aanduiding voor voettekst 5">
             <a:extLst>
               <a:ext uri="{FF2B5EF4-FFF2-40B4-BE49-F238E27FC236}">
-                <a16:creationId xmlns:a16="http://schemas.microsoft.com/office/drawing/2014/main" xmlns="" id="{504C81D0-3C70-46A3-A99B-4387DBE74182}"/>
+                <a16:creationId xmlns="" xmlns:a16="http://schemas.microsoft.com/office/drawing/2014/main" id="{504C81D0-3C70-46A3-A99B-4387DBE74182}"/>
               </a:ext>
             </a:extLst>
           </p:cNvPr>
@@ -2726,7 +2727,7 @@
           <p:cNvPr id="7" name="Tijdelijke aanduiding voor dianummer 6">
             <a:extLst>
               <a:ext uri="{FF2B5EF4-FFF2-40B4-BE49-F238E27FC236}">
-                <a16:creationId xmlns:a16="http://schemas.microsoft.com/office/drawing/2014/main" xmlns="" id="{2DAB8061-1297-4604-AA6D-50FA7517CB04}"/>
+                <a16:creationId xmlns="" xmlns:a16="http://schemas.microsoft.com/office/drawing/2014/main" id="{2DAB8061-1297-4604-AA6D-50FA7517CB04}"/>
               </a:ext>
             </a:extLst>
           </p:cNvPr>
@@ -2745,7 +2746,7 @@
             <a:fld id="{1C1C122E-05CA-4289-A26B-D14C5EAD5EFF}" type="slidenum">
               <a:rPr lang="nl-NL" smtClean="0"/>
               <a:pPr/>
-              <a:t>‹#›</a:t>
+              <a:t>‹nr.›</a:t>
             </a:fld>
             <a:endParaRPr lang="nl-NL"/>
           </a:p>
@@ -2754,7 +2755,7 @@
     </p:spTree>
     <p:extLst>
       <p:ext uri="{BB962C8B-B14F-4D97-AF65-F5344CB8AC3E}">
-        <p14:creationId xmlns:p14="http://schemas.microsoft.com/office/powerpoint/2010/main" val="3080807055"/>
+        <p14:creationId xmlns:p14="http://schemas.microsoft.com/office/powerpoint/2010/main" xmlns="" val="3080807055"/>
       </p:ext>
     </p:extLst>
   </p:cSld>
@@ -2791,7 +2792,7 @@
           <p:cNvPr id="2" name="Tijdelijke aanduiding voor titel 1">
             <a:extLst>
               <a:ext uri="{FF2B5EF4-FFF2-40B4-BE49-F238E27FC236}">
-                <a16:creationId xmlns:a16="http://schemas.microsoft.com/office/drawing/2014/main" xmlns="" id="{D9186CB9-8C46-426D-863D-90A0E0FAEDE7}"/>
+                <a16:creationId xmlns="" xmlns:a16="http://schemas.microsoft.com/office/drawing/2014/main" id="{D9186CB9-8C46-426D-863D-90A0E0FAEDE7}"/>
               </a:ext>
             </a:extLst>
           </p:cNvPr>
@@ -2829,7 +2830,7 @@
           <p:cNvPr id="3" name="Tijdelijke aanduiding voor tekst 2">
             <a:extLst>
               <a:ext uri="{FF2B5EF4-FFF2-40B4-BE49-F238E27FC236}">
-                <a16:creationId xmlns:a16="http://schemas.microsoft.com/office/drawing/2014/main" xmlns="" id="{983F2C53-486F-4745-AD46-503DCDC4D530}"/>
+                <a16:creationId xmlns="" xmlns:a16="http://schemas.microsoft.com/office/drawing/2014/main" id="{983F2C53-486F-4745-AD46-503DCDC4D530}"/>
               </a:ext>
             </a:extLst>
           </p:cNvPr>
@@ -2896,7 +2897,7 @@
           <p:cNvPr id="4" name="Tijdelijke aanduiding voor datum 3">
             <a:extLst>
               <a:ext uri="{FF2B5EF4-FFF2-40B4-BE49-F238E27FC236}">
-                <a16:creationId xmlns:a16="http://schemas.microsoft.com/office/drawing/2014/main" xmlns="" id="{14E5024D-7C9E-4730-908F-8CE183DB279E}"/>
+                <a16:creationId xmlns="" xmlns:a16="http://schemas.microsoft.com/office/drawing/2014/main" id="{14E5024D-7C9E-4730-908F-8CE183DB279E}"/>
               </a:ext>
             </a:extLst>
           </p:cNvPr>
@@ -2933,7 +2934,7 @@
             <a:fld id="{ADE4902F-FBEA-4B35-9D62-082FA2608761}" type="datetimeFigureOut">
               <a:rPr lang="nl-NL" smtClean="0"/>
               <a:pPr/>
-              <a:t>14-11-2017</a:t>
+              <a:t>4-12-2017</a:t>
             </a:fld>
             <a:endParaRPr lang="nl-NL"/>
           </a:p>
@@ -2944,7 +2945,7 @@
           <p:cNvPr id="5" name="Tijdelijke aanduiding voor voettekst 4">
             <a:extLst>
               <a:ext uri="{FF2B5EF4-FFF2-40B4-BE49-F238E27FC236}">
-                <a16:creationId xmlns:a16="http://schemas.microsoft.com/office/drawing/2014/main" xmlns="" id="{CB4A9151-4DBA-4A6C-8967-EC70E0126234}"/>
+                <a16:creationId xmlns="" xmlns:a16="http://schemas.microsoft.com/office/drawing/2014/main" id="{CB4A9151-4DBA-4A6C-8967-EC70E0126234}"/>
               </a:ext>
             </a:extLst>
           </p:cNvPr>
@@ -2987,7 +2988,7 @@
           <p:cNvPr id="6" name="Tijdelijke aanduiding voor dianummer 5">
             <a:extLst>
               <a:ext uri="{FF2B5EF4-FFF2-40B4-BE49-F238E27FC236}">
-                <a16:creationId xmlns:a16="http://schemas.microsoft.com/office/drawing/2014/main" xmlns="" id="{E6582372-88AB-47F3-A35B-A8C86B2D9C2A}"/>
+                <a16:creationId xmlns="" xmlns:a16="http://schemas.microsoft.com/office/drawing/2014/main" id="{E6582372-88AB-47F3-A35B-A8C86B2D9C2A}"/>
               </a:ext>
             </a:extLst>
           </p:cNvPr>
@@ -3024,7 +3025,7 @@
             <a:fld id="{1C1C122E-05CA-4289-A26B-D14C5EAD5EFF}" type="slidenum">
               <a:rPr lang="nl-NL" smtClean="0"/>
               <a:pPr/>
-              <a:t>‹#›</a:t>
+              <a:t>‹nr.›</a:t>
             </a:fld>
             <a:endParaRPr lang="nl-NL"/>
           </a:p>
@@ -3033,7 +3034,7 @@
     </p:spTree>
     <p:extLst>
       <p:ext uri="{BB962C8B-B14F-4D97-AF65-F5344CB8AC3E}">
-        <p14:creationId xmlns:p14="http://schemas.microsoft.com/office/powerpoint/2010/main" val="1831950406"/>
+        <p14:creationId xmlns:p14="http://schemas.microsoft.com/office/powerpoint/2010/main" xmlns="" val="1831950406"/>
       </p:ext>
     </p:extLst>
   </p:cSld>
@@ -3356,7 +3357,7 @@
           <p:cNvPr id="2" name="Titel 1">
             <a:extLst>
               <a:ext uri="{FF2B5EF4-FFF2-40B4-BE49-F238E27FC236}">
-                <a16:creationId xmlns:a16="http://schemas.microsoft.com/office/drawing/2014/main" xmlns="" id="{AE205A44-390E-455B-87E1-6D48C073A474}"/>
+                <a16:creationId xmlns="" xmlns:a16="http://schemas.microsoft.com/office/drawing/2014/main" id="{AE205A44-390E-455B-87E1-6D48C073A474}"/>
               </a:ext>
             </a:extLst>
           </p:cNvPr>
@@ -3396,7 +3397,7 @@
           <p:cNvPr id="3" name="Ondertitel 2">
             <a:extLst>
               <a:ext uri="{FF2B5EF4-FFF2-40B4-BE49-F238E27FC236}">
-                <a16:creationId xmlns:a16="http://schemas.microsoft.com/office/drawing/2014/main" xmlns="" id="{E24A4149-DFE7-4EE0-A98A-18326D7AD35D}"/>
+                <a16:creationId xmlns="" xmlns:a16="http://schemas.microsoft.com/office/drawing/2014/main" id="{E24A4149-DFE7-4EE0-A98A-18326D7AD35D}"/>
               </a:ext>
             </a:extLst>
           </p:cNvPr>
@@ -3422,7 +3423,7 @@
     </p:spTree>
     <p:extLst>
       <p:ext uri="{BB962C8B-B14F-4D97-AF65-F5344CB8AC3E}">
-        <p14:creationId xmlns:p14="http://schemas.microsoft.com/office/powerpoint/2010/main" val="1696353441"/>
+        <p14:creationId xmlns:p14="http://schemas.microsoft.com/office/powerpoint/2010/main" xmlns="" val="1696353441"/>
       </p:ext>
     </p:extLst>
   </p:cSld>
@@ -3461,7 +3462,7 @@
           <p:cNvPr id="2" name="Titel 1">
             <a:extLst>
               <a:ext uri="{FF2B5EF4-FFF2-40B4-BE49-F238E27FC236}">
-                <a16:creationId xmlns:a16="http://schemas.microsoft.com/office/drawing/2014/main" xmlns="" id="{769A96FB-BA26-47C0-85BC-9E5A44D94A65}"/>
+                <a16:creationId xmlns="" xmlns:a16="http://schemas.microsoft.com/office/drawing/2014/main" id="{769A96FB-BA26-47C0-85BC-9E5A44D94A65}"/>
               </a:ext>
             </a:extLst>
           </p:cNvPr>
@@ -3489,7 +3490,7 @@
           <p:cNvPr id="5" name="Tijdelijke aanduiding voor inhoud 4">
             <a:extLst>
               <a:ext uri="{FF2B5EF4-FFF2-40B4-BE49-F238E27FC236}">
-                <a16:creationId xmlns:a16="http://schemas.microsoft.com/office/drawing/2014/main" xmlns="" id="{82F9B9FE-1870-4902-A7DB-4B27D59D2B2B}"/>
+                <a16:creationId xmlns="" xmlns:a16="http://schemas.microsoft.com/office/drawing/2014/main" id="{82F9B9FE-1870-4902-A7DB-4B27D59D2B2B}"/>
               </a:ext>
             </a:extLst>
           </p:cNvPr>
@@ -3504,7 +3505,7 @@
           <a:blip r:embed="rId2" cstate="print">
             <a:extLst>
               <a:ext uri="{28A0092B-C50C-407E-A947-70E740481C1C}">
-                <a14:useLocalDpi xmlns:a14="http://schemas.microsoft.com/office/drawing/2010/main" val="0"/>
+                <a14:useLocalDpi xmlns:a14="http://schemas.microsoft.com/office/drawing/2010/main" xmlns="" val="0"/>
               </a:ext>
             </a:extLst>
           </a:blip>
@@ -3524,7 +3525,7 @@
           <p:cNvPr id="6" name="Tekstvak 5">
             <a:extLst>
               <a:ext uri="{FF2B5EF4-FFF2-40B4-BE49-F238E27FC236}">
-                <a16:creationId xmlns:a16="http://schemas.microsoft.com/office/drawing/2014/main" xmlns="" id="{D8F2D3D1-1FE8-4AA0-B6C8-D7E88097CE04}"/>
+                <a16:creationId xmlns="" xmlns:a16="http://schemas.microsoft.com/office/drawing/2014/main" id="{D8F2D3D1-1FE8-4AA0-B6C8-D7E88097CE04}"/>
               </a:ext>
             </a:extLst>
           </p:cNvPr>
@@ -3560,7 +3561,7 @@
           <p:cNvPr id="8" name="Afbeelding 7">
             <a:extLst>
               <a:ext uri="{FF2B5EF4-FFF2-40B4-BE49-F238E27FC236}">
-                <a16:creationId xmlns:a16="http://schemas.microsoft.com/office/drawing/2014/main" xmlns="" id="{819AAC82-0B32-4FA7-B311-90C90A003DAD}"/>
+                <a16:creationId xmlns="" xmlns:a16="http://schemas.microsoft.com/office/drawing/2014/main" id="{819AAC82-0B32-4FA7-B311-90C90A003DAD}"/>
               </a:ext>
             </a:extLst>
           </p:cNvPr>
@@ -3573,7 +3574,7 @@
           <a:blip r:embed="rId3" cstate="print">
             <a:extLst>
               <a:ext uri="{28A0092B-C50C-407E-A947-70E740481C1C}">
-                <a14:useLocalDpi xmlns:a14="http://schemas.microsoft.com/office/drawing/2010/main" val="0"/>
+                <a14:useLocalDpi xmlns:a14="http://schemas.microsoft.com/office/drawing/2010/main" xmlns="" val="0"/>
               </a:ext>
             </a:extLst>
           </a:blip>
@@ -3595,7 +3596,7 @@
           <p:cNvPr id="11" name="Pijl: rechts 10">
             <a:extLst>
               <a:ext uri="{FF2B5EF4-FFF2-40B4-BE49-F238E27FC236}">
-                <a16:creationId xmlns:a16="http://schemas.microsoft.com/office/drawing/2014/main" xmlns="" id="{C3B3C454-C61F-4642-AC5E-175E78B46E93}"/>
+                <a16:creationId xmlns="" xmlns:a16="http://schemas.microsoft.com/office/drawing/2014/main" id="{C3B3C454-C61F-4642-AC5E-175E78B46E93}"/>
               </a:ext>
             </a:extLst>
           </p:cNvPr>
@@ -3641,7 +3642,7 @@
           <p:cNvPr id="12" name="Tekstvak 11">
             <a:extLst>
               <a:ext uri="{FF2B5EF4-FFF2-40B4-BE49-F238E27FC236}">
-                <a16:creationId xmlns:a16="http://schemas.microsoft.com/office/drawing/2014/main" xmlns="" id="{1AF95B95-DF37-4511-BC26-2A337B82EADC}"/>
+                <a16:creationId xmlns="" xmlns:a16="http://schemas.microsoft.com/office/drawing/2014/main" id="{1AF95B95-DF37-4511-BC26-2A337B82EADC}"/>
               </a:ext>
             </a:extLst>
           </p:cNvPr>
@@ -3676,7 +3677,7 @@
           <p:cNvPr id="9" name="Afbeelding 8">
             <a:extLst>
               <a:ext uri="{FF2B5EF4-FFF2-40B4-BE49-F238E27FC236}">
-                <a16:creationId xmlns:a16="http://schemas.microsoft.com/office/drawing/2014/main" xmlns="" id="{1B858127-D2F6-4D2B-B5A9-94CF7612B179}"/>
+                <a16:creationId xmlns="" xmlns:a16="http://schemas.microsoft.com/office/drawing/2014/main" id="{1B858127-D2F6-4D2B-B5A9-94CF7612B179}"/>
               </a:ext>
             </a:extLst>
           </p:cNvPr>
@@ -3689,7 +3690,7 @@
           <a:blip r:embed="rId4" cstate="print">
             <a:extLst>
               <a:ext uri="{28A0092B-C50C-407E-A947-70E740481C1C}">
-                <a14:useLocalDpi xmlns:a14="http://schemas.microsoft.com/office/drawing/2010/main" val="0"/>
+                <a14:useLocalDpi xmlns:a14="http://schemas.microsoft.com/office/drawing/2010/main" xmlns="" val="0"/>
               </a:ext>
             </a:extLst>
           </a:blip>
@@ -3712,7 +3713,7 @@
           <p:cNvPr id="10" name="Pijl: rechts 9">
             <a:extLst>
               <a:ext uri="{FF2B5EF4-FFF2-40B4-BE49-F238E27FC236}">
-                <a16:creationId xmlns:a16="http://schemas.microsoft.com/office/drawing/2014/main" xmlns="" id="{13F3850F-71EA-4741-A182-94C4C2F636F5}"/>
+                <a16:creationId xmlns="" xmlns:a16="http://schemas.microsoft.com/office/drawing/2014/main" id="{13F3850F-71EA-4741-A182-94C4C2F636F5}"/>
               </a:ext>
             </a:extLst>
           </p:cNvPr>
@@ -3756,7 +3757,7 @@
     </p:spTree>
     <p:extLst>
       <p:ext uri="{BB962C8B-B14F-4D97-AF65-F5344CB8AC3E}">
-        <p14:creationId xmlns:p14="http://schemas.microsoft.com/office/powerpoint/2010/main" val="2643686151"/>
+        <p14:creationId xmlns:p14="http://schemas.microsoft.com/office/powerpoint/2010/main" xmlns="" val="2643686151"/>
       </p:ext>
     </p:extLst>
   </p:cSld>
@@ -3795,7 +3796,7 @@
           <p:cNvPr id="2" name="Titel 1">
             <a:extLst>
               <a:ext uri="{FF2B5EF4-FFF2-40B4-BE49-F238E27FC236}">
-                <a16:creationId xmlns:a16="http://schemas.microsoft.com/office/drawing/2014/main" xmlns="" id="{769A96FB-BA26-47C0-85BC-9E5A44D94A65}"/>
+                <a16:creationId xmlns="" xmlns:a16="http://schemas.microsoft.com/office/drawing/2014/main" id="{769A96FB-BA26-47C0-85BC-9E5A44D94A65}"/>
               </a:ext>
             </a:extLst>
           </p:cNvPr>
@@ -3823,7 +3824,7 @@
           <p:cNvPr id="5" name="Tijdelijke aanduiding voor inhoud 4">
             <a:extLst>
               <a:ext uri="{FF2B5EF4-FFF2-40B4-BE49-F238E27FC236}">
-                <a16:creationId xmlns:a16="http://schemas.microsoft.com/office/drawing/2014/main" xmlns="" id="{82F9B9FE-1870-4902-A7DB-4B27D59D2B2B}"/>
+                <a16:creationId xmlns="" xmlns:a16="http://schemas.microsoft.com/office/drawing/2014/main" id="{82F9B9FE-1870-4902-A7DB-4B27D59D2B2B}"/>
               </a:ext>
             </a:extLst>
           </p:cNvPr>
@@ -3838,7 +3839,7 @@
           <a:blip r:embed="rId2" cstate="print">
             <a:extLst>
               <a:ext uri="{28A0092B-C50C-407E-A947-70E740481C1C}">
-                <a14:useLocalDpi xmlns:a14="http://schemas.microsoft.com/office/drawing/2010/main" val="0"/>
+                <a14:useLocalDpi xmlns:a14="http://schemas.microsoft.com/office/drawing/2010/main" xmlns="" val="0"/>
               </a:ext>
             </a:extLst>
           </a:blip>
@@ -3858,7 +3859,7 @@
           <p:cNvPr id="6" name="Tekstvak 5">
             <a:extLst>
               <a:ext uri="{FF2B5EF4-FFF2-40B4-BE49-F238E27FC236}">
-                <a16:creationId xmlns:a16="http://schemas.microsoft.com/office/drawing/2014/main" xmlns="" id="{D8F2D3D1-1FE8-4AA0-B6C8-D7E88097CE04}"/>
+                <a16:creationId xmlns="" xmlns:a16="http://schemas.microsoft.com/office/drawing/2014/main" id="{D8F2D3D1-1FE8-4AA0-B6C8-D7E88097CE04}"/>
               </a:ext>
             </a:extLst>
           </p:cNvPr>
@@ -3894,7 +3895,7 @@
           <p:cNvPr id="8" name="Afbeelding 7">
             <a:extLst>
               <a:ext uri="{FF2B5EF4-FFF2-40B4-BE49-F238E27FC236}">
-                <a16:creationId xmlns:a16="http://schemas.microsoft.com/office/drawing/2014/main" xmlns="" id="{819AAC82-0B32-4FA7-B311-90C90A003DAD}"/>
+                <a16:creationId xmlns="" xmlns:a16="http://schemas.microsoft.com/office/drawing/2014/main" id="{819AAC82-0B32-4FA7-B311-90C90A003DAD}"/>
               </a:ext>
             </a:extLst>
           </p:cNvPr>
@@ -3907,7 +3908,7 @@
           <a:blip r:embed="rId3" cstate="print">
             <a:extLst>
               <a:ext uri="{28A0092B-C50C-407E-A947-70E740481C1C}">
-                <a14:useLocalDpi xmlns:a14="http://schemas.microsoft.com/office/drawing/2010/main" val="0"/>
+                <a14:useLocalDpi xmlns:a14="http://schemas.microsoft.com/office/drawing/2010/main" xmlns="" val="0"/>
               </a:ext>
             </a:extLst>
           </a:blip>
@@ -3929,7 +3930,7 @@
           <p:cNvPr id="11" name="Pijl: rechts 10">
             <a:extLst>
               <a:ext uri="{FF2B5EF4-FFF2-40B4-BE49-F238E27FC236}">
-                <a16:creationId xmlns:a16="http://schemas.microsoft.com/office/drawing/2014/main" xmlns="" id="{C3B3C454-C61F-4642-AC5E-175E78B46E93}"/>
+                <a16:creationId xmlns="" xmlns:a16="http://schemas.microsoft.com/office/drawing/2014/main" id="{C3B3C454-C61F-4642-AC5E-175E78B46E93}"/>
               </a:ext>
             </a:extLst>
           </p:cNvPr>
@@ -3975,7 +3976,7 @@
           <p:cNvPr id="12" name="Tekstvak 11">
             <a:extLst>
               <a:ext uri="{FF2B5EF4-FFF2-40B4-BE49-F238E27FC236}">
-                <a16:creationId xmlns:a16="http://schemas.microsoft.com/office/drawing/2014/main" xmlns="" id="{1AF95B95-DF37-4511-BC26-2A337B82EADC}"/>
+                <a16:creationId xmlns="" xmlns:a16="http://schemas.microsoft.com/office/drawing/2014/main" id="{1AF95B95-DF37-4511-BC26-2A337B82EADC}"/>
               </a:ext>
             </a:extLst>
           </p:cNvPr>
@@ -4010,7 +4011,7 @@
           <p:cNvPr id="9" name="Afbeelding 8">
             <a:extLst>
               <a:ext uri="{FF2B5EF4-FFF2-40B4-BE49-F238E27FC236}">
-                <a16:creationId xmlns:a16="http://schemas.microsoft.com/office/drawing/2014/main" xmlns="" id="{1B858127-D2F6-4D2B-B5A9-94CF7612B179}"/>
+                <a16:creationId xmlns="" xmlns:a16="http://schemas.microsoft.com/office/drawing/2014/main" id="{1B858127-D2F6-4D2B-B5A9-94CF7612B179}"/>
               </a:ext>
             </a:extLst>
           </p:cNvPr>
@@ -4023,7 +4024,7 @@
           <a:blip r:embed="rId4" cstate="print">
             <a:extLst>
               <a:ext uri="{28A0092B-C50C-407E-A947-70E740481C1C}">
-                <a14:useLocalDpi xmlns:a14="http://schemas.microsoft.com/office/drawing/2010/main" val="0"/>
+                <a14:useLocalDpi xmlns:a14="http://schemas.microsoft.com/office/drawing/2010/main" xmlns="" val="0"/>
               </a:ext>
             </a:extLst>
           </a:blip>
@@ -4046,7 +4047,7 @@
           <p:cNvPr id="10" name="Pijl: rechts 9">
             <a:extLst>
               <a:ext uri="{FF2B5EF4-FFF2-40B4-BE49-F238E27FC236}">
-                <a16:creationId xmlns:a16="http://schemas.microsoft.com/office/drawing/2014/main" xmlns="" id="{13F3850F-71EA-4741-A182-94C4C2F636F5}"/>
+                <a16:creationId xmlns="" xmlns:a16="http://schemas.microsoft.com/office/drawing/2014/main" id="{13F3850F-71EA-4741-A182-94C4C2F636F5}"/>
               </a:ext>
             </a:extLst>
           </p:cNvPr>
@@ -4092,7 +4093,7 @@
           <p:cNvPr id="3" name="Ovaal 2">
             <a:extLst>
               <a:ext uri="{FF2B5EF4-FFF2-40B4-BE49-F238E27FC236}">
-                <a16:creationId xmlns:a16="http://schemas.microsoft.com/office/drawing/2014/main" xmlns="" id="{19B9F891-8EF8-44F6-B6ED-BB2422D771A3}"/>
+                <a16:creationId xmlns="" xmlns:a16="http://schemas.microsoft.com/office/drawing/2014/main" id="{19B9F891-8EF8-44F6-B6ED-BB2422D771A3}"/>
               </a:ext>
             </a:extLst>
           </p:cNvPr>
@@ -4141,7 +4142,7 @@
           <p:cNvPr id="13" name="Ovaal 12">
             <a:extLst>
               <a:ext uri="{FF2B5EF4-FFF2-40B4-BE49-F238E27FC236}">
-                <a16:creationId xmlns:a16="http://schemas.microsoft.com/office/drawing/2014/main" xmlns="" id="{24DD1F6E-573A-4E2D-8811-591CE94E629B}"/>
+                <a16:creationId xmlns="" xmlns:a16="http://schemas.microsoft.com/office/drawing/2014/main" id="{24DD1F6E-573A-4E2D-8811-591CE94E629B}"/>
               </a:ext>
             </a:extLst>
           </p:cNvPr>
@@ -4190,7 +4191,7 @@
           <p:cNvPr id="7" name="Rechte verbindingslijn met pijl 6">
             <a:extLst>
               <a:ext uri="{FF2B5EF4-FFF2-40B4-BE49-F238E27FC236}">
-                <a16:creationId xmlns:a16="http://schemas.microsoft.com/office/drawing/2014/main" xmlns="" id="{D5C82334-4E2E-4051-961A-F679B07C4F1F}"/>
+                <a16:creationId xmlns="" xmlns:a16="http://schemas.microsoft.com/office/drawing/2014/main" id="{D5C82334-4E2E-4051-961A-F679B07C4F1F}"/>
               </a:ext>
             </a:extLst>
           </p:cNvPr>
@@ -4232,7 +4233,7 @@
           <p:cNvPr id="16" name="Rechte verbindingslijn met pijl 15">
             <a:extLst>
               <a:ext uri="{FF2B5EF4-FFF2-40B4-BE49-F238E27FC236}">
-                <a16:creationId xmlns:a16="http://schemas.microsoft.com/office/drawing/2014/main" xmlns="" id="{705EA1F6-DA7E-4475-8576-E76A7C126F12}"/>
+                <a16:creationId xmlns="" xmlns:a16="http://schemas.microsoft.com/office/drawing/2014/main" id="{705EA1F6-DA7E-4475-8576-E76A7C126F12}"/>
               </a:ext>
             </a:extLst>
           </p:cNvPr>
@@ -4272,7 +4273,7 @@
     </p:spTree>
     <p:extLst>
       <p:ext uri="{BB962C8B-B14F-4D97-AF65-F5344CB8AC3E}">
-        <p14:creationId xmlns:p14="http://schemas.microsoft.com/office/powerpoint/2010/main" val="845698545"/>
+        <p14:creationId xmlns:p14="http://schemas.microsoft.com/office/powerpoint/2010/main" xmlns="" val="845698545"/>
       </p:ext>
     </p:extLst>
   </p:cSld>
@@ -4311,7 +4312,7 @@
           <p:cNvPr id="2" name="Titel 1">
             <a:extLst>
               <a:ext uri="{FF2B5EF4-FFF2-40B4-BE49-F238E27FC236}">
-                <a16:creationId xmlns:a16="http://schemas.microsoft.com/office/drawing/2014/main" xmlns="" id="{28AC7F7A-EB5E-48A2-A178-02E17BA194BE}"/>
+                <a16:creationId xmlns="" xmlns:a16="http://schemas.microsoft.com/office/drawing/2014/main" id="{28AC7F7A-EB5E-48A2-A178-02E17BA194BE}"/>
               </a:ext>
             </a:extLst>
           </p:cNvPr>
@@ -4356,7 +4357,7 @@
           <p:cNvPr id="4" name="Tijdelijke aanduiding voor inhoud 3">
             <a:extLst>
               <a:ext uri="{FF2B5EF4-FFF2-40B4-BE49-F238E27FC236}">
-                <a16:creationId xmlns:a16="http://schemas.microsoft.com/office/drawing/2014/main" xmlns="" id="{12A0C32B-A310-4B27-B6D9-73509A425B75}"/>
+                <a16:creationId xmlns="" xmlns:a16="http://schemas.microsoft.com/office/drawing/2014/main" id="{12A0C32B-A310-4B27-B6D9-73509A425B75}"/>
               </a:ext>
             </a:extLst>
           </p:cNvPr>
@@ -4385,7 +4386,7 @@
     </p:spTree>
     <p:extLst>
       <p:ext uri="{BB962C8B-B14F-4D97-AF65-F5344CB8AC3E}">
-        <p14:creationId xmlns:p14="http://schemas.microsoft.com/office/powerpoint/2010/main" val="2460963347"/>
+        <p14:creationId xmlns:p14="http://schemas.microsoft.com/office/powerpoint/2010/main" xmlns="" val="2460963347"/>
       </p:ext>
     </p:extLst>
   </p:cSld>
@@ -4534,7 +4535,6 @@
               <a:rPr lang="en-US" dirty="0" smtClean="0"/>
               <a:t>Upper/Lower Bound</a:t>
             </a:r>
-            <a:endParaRPr lang="en-US" dirty="0" smtClean="0"/>
           </a:p>
           <a:p>
             <a:pPr marL="457200" lvl="1" indent="0">
@@ -4601,42 +4601,91 @@
               <a:rPr lang="en-US" dirty="0" err="1" smtClean="0"/>
               <a:t>Methode</a:t>
             </a:r>
+            <a:r>
+              <a:rPr lang="en-US" dirty="0" smtClean="0"/>
+              <a:t>	</a:t>
+            </a:r>
             <a:endParaRPr lang="en-US" dirty="0"/>
           </a:p>
         </p:txBody>
       </p:sp>
-      <p:pic>
-        <p:nvPicPr>
-          <p:cNvPr id="1026" name="Picture 2"/>
-          <p:cNvPicPr>
-            <a:picLocks noChangeAspect="1" noChangeArrowheads="1"/>
-          </p:cNvPicPr>
-          <p:nvPr/>
-        </p:nvPicPr>
-        <p:blipFill>
-          <a:blip r:embed="rId2" cstate="print"/>
-          <a:srcRect/>
-          <a:stretch>
-            <a:fillRect/>
-          </a:stretch>
-        </p:blipFill>
-        <p:spPr bwMode="auto">
-          <a:xfrm>
-            <a:off x="951669" y="1750958"/>
-            <a:ext cx="8206610" cy="3899414"/>
-          </a:xfrm>
-          <a:prstGeom prst="rect">
-            <a:avLst/>
-          </a:prstGeom>
-          <a:noFill/>
-          <a:ln w="9525">
-            <a:noFill/>
-            <a:miter lim="800000"/>
-            <a:headEnd/>
-            <a:tailEnd/>
-          </a:ln>
-        </p:spPr>
-      </p:pic>
+      <p:sp>
+        <p:nvSpPr>
+          <p:cNvPr id="3" name="Tijdelijke aanduiding voor inhoud 2"/>
+          <p:cNvSpPr>
+            <a:spLocks noGrp="1"/>
+          </p:cNvSpPr>
+          <p:nvPr>
+            <p:ph idx="1"/>
+          </p:nvPr>
+        </p:nvSpPr>
+        <p:spPr/>
+        <p:txBody>
+          <a:bodyPr/>
+          <a:lstStyle/>
+          <a:p>
+            <a:r>
+              <a:rPr lang="nl-NL" dirty="0" smtClean="0"/>
+              <a:t>Classes</a:t>
+            </a:r>
+          </a:p>
+          <a:p>
+            <a:pPr lvl="1"/>
+            <a:r>
+              <a:rPr lang="nl-NL" dirty="0" err="1" smtClean="0"/>
+              <a:t>Amino</a:t>
+            </a:r>
+            <a:r>
+              <a:rPr lang="nl-NL" dirty="0" smtClean="0"/>
+              <a:t> Acid</a:t>
+            </a:r>
+          </a:p>
+          <a:p>
+            <a:pPr lvl="1"/>
+            <a:r>
+              <a:rPr lang="nl-NL" dirty="0" err="1" smtClean="0"/>
+              <a:t>Amino</a:t>
+            </a:r>
+            <a:r>
+              <a:rPr lang="nl-NL" dirty="0" smtClean="0"/>
+              <a:t> Acid </a:t>
+            </a:r>
+            <a:r>
+              <a:rPr lang="nl-NL" dirty="0" err="1" smtClean="0"/>
+              <a:t>Chain</a:t>
+            </a:r>
+            <a:endParaRPr lang="nl-NL" dirty="0" smtClean="0"/>
+          </a:p>
+          <a:p>
+            <a:r>
+              <a:rPr lang="nl-NL" dirty="0" smtClean="0"/>
+              <a:t>Assenstelsel </a:t>
+            </a:r>
+            <a:endParaRPr lang="nl-NL" dirty="0" smtClean="0"/>
+          </a:p>
+          <a:p>
+            <a:pPr lvl="1"/>
+            <a:r>
+              <a:rPr lang="nl-NL" dirty="0" smtClean="0"/>
+              <a:t>2D (x, y)</a:t>
+            </a:r>
+          </a:p>
+          <a:p>
+            <a:pPr lvl="1"/>
+            <a:r>
+              <a:rPr lang="nl-NL" dirty="0" smtClean="0"/>
+              <a:t>3D (x, y, z)</a:t>
+            </a:r>
+          </a:p>
+          <a:p>
+            <a:r>
+              <a:rPr lang="nl-NL" dirty="0" smtClean="0"/>
+              <a:t>Plot</a:t>
+            </a:r>
+            <a:endParaRPr lang="en-US" dirty="0"/>
+          </a:p>
+        </p:txBody>
+      </p:sp>
     </p:spTree>
   </p:cSld>
   <p:clrMapOvr>
@@ -4688,73 +4737,55 @@
               <a:rPr lang="en-US" dirty="0" err="1" smtClean="0"/>
               <a:t>Methode</a:t>
             </a:r>
+            <a:endParaRPr lang="en-US" dirty="0"/>
+          </a:p>
+        </p:txBody>
+      </p:sp>
+      <p:sp>
+        <p:nvSpPr>
+          <p:cNvPr id="3" name="Tijdelijke aanduiding voor inhoud 2"/>
+          <p:cNvSpPr>
+            <a:spLocks noGrp="1"/>
+          </p:cNvSpPr>
+          <p:nvPr>
+            <p:ph idx="1"/>
+          </p:nvPr>
+        </p:nvSpPr>
+        <p:spPr/>
+        <p:txBody>
+          <a:bodyPr/>
+          <a:lstStyle/>
+          <a:p>
+            <a:r>
+              <a:rPr lang="en-US" dirty="0" err="1" smtClean="0"/>
+              <a:t>Algoritmes</a:t>
+            </a:r>
             <a:r>
               <a:rPr lang="en-US" dirty="0" smtClean="0"/>
-              <a:t>	</a:t>
-            </a:r>
-            <a:endParaRPr lang="en-US" dirty="0"/>
-          </a:p>
-        </p:txBody>
-      </p:sp>
-      <p:sp>
-        <p:nvSpPr>
-          <p:cNvPr id="3" name="Tijdelijke aanduiding voor inhoud 2"/>
-          <p:cNvSpPr>
-            <a:spLocks noGrp="1"/>
-          </p:cNvSpPr>
-          <p:nvPr>
-            <p:ph idx="1"/>
-          </p:nvPr>
-        </p:nvSpPr>
-        <p:spPr/>
-        <p:txBody>
-          <a:bodyPr/>
-          <a:lstStyle/>
-          <a:p>
-            <a:r>
-              <a:rPr lang="nl-NL" dirty="0" smtClean="0"/>
-              <a:t>Random vouwen</a:t>
+              <a:t>:</a:t>
             </a:r>
           </a:p>
           <a:p>
             <a:pPr lvl="1"/>
             <a:r>
-              <a:rPr lang="nl-NL" dirty="0" err="1" smtClean="0"/>
-              <a:t>Constraints</a:t>
-            </a:r>
-            <a:r>
-              <a:rPr lang="nl-NL" dirty="0" smtClean="0"/>
-              <a:t>	 </a:t>
-            </a:r>
-          </a:p>
-          <a:p>
-            <a:r>
-              <a:rPr lang="nl-NL" dirty="0" smtClean="0"/>
-              <a:t>Assenstelsel </a:t>
+              <a:rPr lang="en-US" dirty="0" smtClean="0"/>
+              <a:t>Random</a:t>
             </a:r>
           </a:p>
           <a:p>
             <a:pPr lvl="1"/>
             <a:r>
-              <a:rPr lang="nl-NL" dirty="0" smtClean="0"/>
-              <a:t>2D (x, y)</a:t>
+              <a:rPr lang="en-US" dirty="0" smtClean="0"/>
+              <a:t>Breadth-first</a:t>
             </a:r>
           </a:p>
           <a:p>
             <a:pPr lvl="1"/>
             <a:r>
-              <a:rPr lang="nl-NL" dirty="0" smtClean="0"/>
-              <a:t>3D (x, y, z)</a:t>
-            </a:r>
-          </a:p>
-          <a:p>
-            <a:r>
-              <a:rPr lang="nl-NL" dirty="0" smtClean="0"/>
-              <a:t>Plot</a:t>
-            </a:r>
-          </a:p>
-          <a:p>
-            <a:endParaRPr lang="en-US" dirty="0"/>
+              <a:rPr lang="en-US" dirty="0" err="1" smtClean="0"/>
+              <a:t>Hillclimber</a:t>
+            </a:r>
+            <a:endParaRPr lang="en-US" dirty="0" smtClean="0"/>
           </a:p>
         </p:txBody>
       </p:sp>
@@ -4763,13 +4794,73 @@
   <p:clrMapOvr>
     <a:masterClrMapping/>
   </p:clrMapOvr>
-  <p:timing>
-    <p:tnLst>
-      <p:par>
-        <p:cTn id="1" dur="indefinite" restart="never" nodeType="tmRoot"/>
-      </p:par>
-    </p:tnLst>
-  </p:timing>
+</p:sld>
+</file>
+
+<file path=ppt/slides/slide8.xml><?xml version="1.0" encoding="utf-8"?>
+<p:sld xmlns:a="http://schemas.openxmlformats.org/drawingml/2006/main" xmlns:r="http://schemas.openxmlformats.org/officeDocument/2006/relationships" xmlns:p="http://schemas.openxmlformats.org/presentationml/2006/main">
+  <p:cSld>
+    <p:spTree>
+      <p:nvGrpSpPr>
+        <p:cNvPr id="1" name=""/>
+        <p:cNvGrpSpPr/>
+        <p:nvPr/>
+      </p:nvGrpSpPr>
+      <p:grpSpPr>
+        <a:xfrm>
+          <a:off x="0" y="0"/>
+          <a:ext cx="0" cy="0"/>
+          <a:chOff x="0" y="0"/>
+          <a:chExt cx="0" cy="0"/>
+        </a:xfrm>
+      </p:grpSpPr>
+      <p:sp>
+        <p:nvSpPr>
+          <p:cNvPr id="2" name="Titel 1"/>
+          <p:cNvSpPr>
+            <a:spLocks noGrp="1"/>
+          </p:cNvSpPr>
+          <p:nvPr>
+            <p:ph type="title"/>
+          </p:nvPr>
+        </p:nvSpPr>
+        <p:spPr/>
+        <p:txBody>
+          <a:bodyPr/>
+          <a:lstStyle/>
+          <a:p>
+            <a:r>
+              <a:rPr lang="en-US" dirty="0" err="1" smtClean="0"/>
+              <a:t>Resultaten</a:t>
+            </a:r>
+            <a:endParaRPr lang="en-US" dirty="0"/>
+          </a:p>
+        </p:txBody>
+      </p:sp>
+      <p:sp>
+        <p:nvSpPr>
+          <p:cNvPr id="3" name="Tijdelijke aanduiding voor inhoud 2"/>
+          <p:cNvSpPr>
+            <a:spLocks noGrp="1"/>
+          </p:cNvSpPr>
+          <p:nvPr>
+            <p:ph idx="1"/>
+          </p:nvPr>
+        </p:nvSpPr>
+        <p:spPr/>
+        <p:txBody>
+          <a:bodyPr/>
+          <a:lstStyle/>
+          <a:p>
+            <a:endParaRPr lang="en-US"/>
+          </a:p>
+        </p:txBody>
+      </p:sp>
+    </p:spTree>
+  </p:cSld>
+  <p:clrMapOvr>
+    <a:masterClrMapping/>
+  </p:clrMapOvr>
 </p:sld>
 </file>
 
@@ -5062,7 +5153,7 @@
   <a:extraClrSchemeLst/>
   <a:extLst>
     <a:ext uri="{05A4C25C-085E-4340-85A3-A5531E510DB2}">
-      <thm15:themeFamily xmlns:thm15="http://schemas.microsoft.com/office/thememl/2012/main" xmlns="" name="Office Theme" id="{62F939B6-93AF-4DB8-9C6B-D6C7DFDC589F}" vid="{4A3C46E8-61CC-4603-A589-7422A47A8E4A}"/>
+      <thm15:themeFamily xmlns="" xmlns:thm15="http://schemas.microsoft.com/office/thememl/2012/main" name="Office Theme" id="{62F939B6-93AF-4DB8-9C6B-D6C7DFDC589F}" vid="{4A3C46E8-61CC-4603-A589-7422A47A8E4A}"/>
     </a:ext>
   </a:extLst>
 </a:theme>

</xml_diff>